<commit_message>
Fix location of holding registers, changes to line_cb are now correctly carried out.
</commit_message>
<xml_diff>
--- a/drawing.pptx
+++ b/drawing.pptx
@@ -7,6 +7,7 @@
   <p:sldIdLst>
     <p:sldId id="256" r:id="rId2"/>
     <p:sldId id="257" r:id="rId3"/>
+    <p:sldId id="258" r:id="rId4"/>
   </p:sldIdLst>
   <p:sldSz cx="12192000" cy="6858000"/>
   <p:notesSz cx="6858000" cy="9144000"/>
@@ -105,13 +106,18 @@
       </a:defRPr>
     </a:lvl9pPr>
   </p:defaultTextStyle>
+  <p:extLst>
+    <p:ext uri="{EFAFB233-063F-42B5-8137-9DF3F51BA10A}">
+      <p15:sldGuideLst xmlns:p15="http://schemas.microsoft.com/office/powerpoint/2012/main"/>
+    </p:ext>
+  </p:extLst>
 </p:presentation>
 </file>
 
 <file path=ppt/revisionInfo.xml><?xml version="1.0" encoding="utf-8"?>
 <p1510:revInfo xmlns:a="http://schemas.openxmlformats.org/drawingml/2006/main" xmlns:r="http://schemas.openxmlformats.org/officeDocument/2006/relationships" xmlns:p1510="http://schemas.microsoft.com/office/powerpoint/2015/10/main">
   <p1510:revLst>
-    <p1510:client id="{EA0173B0-958D-499E-BBD7-4DCDDBA7CDEB}" v="4" dt="2025-05-13T06:13:40.310"/>
+    <p1510:client id="{EA0173B0-958D-499E-BBD7-4DCDDBA7CDEB}" v="17" dt="2025-05-15T05:43:43.782"/>
   </p1510:revLst>
 </p1510:revInfo>
 </file>
@@ -120,8 +126,8 @@
 <pc:chgInfo xmlns:a="http://schemas.openxmlformats.org/drawingml/2006/main" xmlns:r="http://schemas.openxmlformats.org/officeDocument/2006/relationships" xmlns:ac="http://schemas.microsoft.com/office/drawing/2013/main/command" xmlns:pc="http://schemas.microsoft.com/office/powerpoint/2013/main/command">
   <pc:docChgLst>
     <pc:chgData name="ME4-T DANZA SEAH" userId="29685724598694ca" providerId="LiveId" clId="{EA0173B0-958D-499E-BBD7-4DCDDBA7CDEB}"/>
-    <pc:docChg chg="custSel modSld">
-      <pc:chgData name="ME4-T DANZA SEAH" userId="29685724598694ca" providerId="LiveId" clId="{EA0173B0-958D-499E-BBD7-4DCDDBA7CDEB}" dt="2025-05-13T06:16:52.275" v="186" actId="207"/>
+    <pc:docChg chg="undo custSel addSld modSld">
+      <pc:chgData name="ME4-T DANZA SEAH" userId="29685724598694ca" providerId="LiveId" clId="{EA0173B0-958D-499E-BBD7-4DCDDBA7CDEB}" dt="2025-05-15T05:44:18.634" v="269" actId="208"/>
       <pc:docMkLst>
         <pc:docMk/>
       </pc:docMkLst>
@@ -196,6 +202,165 @@
           </ac:spMkLst>
         </pc:spChg>
       </pc:sldChg>
+      <pc:sldChg chg="addSp delSp modSp new mod">
+        <pc:chgData name="ME4-T DANZA SEAH" userId="29685724598694ca" providerId="LiveId" clId="{EA0173B0-958D-499E-BBD7-4DCDDBA7CDEB}" dt="2025-05-15T05:44:18.634" v="269" actId="208"/>
+        <pc:sldMkLst>
+          <pc:docMk/>
+          <pc:sldMk cId="1372095160" sldId="258"/>
+        </pc:sldMkLst>
+        <pc:spChg chg="del">
+          <ac:chgData name="ME4-T DANZA SEAH" userId="29685724598694ca" providerId="LiveId" clId="{EA0173B0-958D-499E-BBD7-4DCDDBA7CDEB}" dt="2025-05-15T05:40:40.634" v="221" actId="478"/>
+          <ac:spMkLst>
+            <pc:docMk/>
+            <pc:sldMk cId="1372095160" sldId="258"/>
+            <ac:spMk id="2" creationId="{991C466A-A495-BA69-4165-9195CE052FC4}"/>
+          </ac:spMkLst>
+        </pc:spChg>
+        <pc:spChg chg="add del">
+          <ac:chgData name="ME4-T DANZA SEAH" userId="29685724598694ca" providerId="LiveId" clId="{EA0173B0-958D-499E-BBD7-4DCDDBA7CDEB}" dt="2025-05-15T05:40:47.717" v="224" actId="478"/>
+          <ac:spMkLst>
+            <pc:docMk/>
+            <pc:sldMk cId="1372095160" sldId="258"/>
+            <ac:spMk id="3" creationId="{50095E63-104A-0E9A-8FED-882264E941E1}"/>
+          </ac:spMkLst>
+        </pc:spChg>
+        <pc:spChg chg="add del">
+          <ac:chgData name="ME4-T DANZA SEAH" userId="29685724598694ca" providerId="LiveId" clId="{EA0173B0-958D-499E-BBD7-4DCDDBA7CDEB}" dt="2025-05-15T05:40:24.140" v="217" actId="22"/>
+          <ac:spMkLst>
+            <pc:docMk/>
+            <pc:sldMk cId="1372095160" sldId="258"/>
+            <ac:spMk id="23" creationId="{F663874C-23D3-B16C-E4B0-0B62E6DD3AAE}"/>
+          </ac:spMkLst>
+        </pc:spChg>
+        <pc:picChg chg="add del mod">
+          <ac:chgData name="ME4-T DANZA SEAH" userId="29685724598694ca" providerId="LiveId" clId="{EA0173B0-958D-499E-BBD7-4DCDDBA7CDEB}" dt="2025-05-15T05:40:21.577" v="215" actId="478"/>
+          <ac:picMkLst>
+            <pc:docMk/>
+            <pc:sldMk cId="1372095160" sldId="258"/>
+            <ac:picMk id="5" creationId="{504FF769-F7C0-C6C2-8CA8-EFD7EC7C153C}"/>
+          </ac:picMkLst>
+        </pc:picChg>
+        <pc:picChg chg="add del mod ord">
+          <ac:chgData name="ME4-T DANZA SEAH" userId="29685724598694ca" providerId="LiveId" clId="{EA0173B0-958D-499E-BBD7-4DCDDBA7CDEB}" dt="2025-05-15T05:43:09.559" v="247" actId="1076"/>
+          <ac:picMkLst>
+            <pc:docMk/>
+            <pc:sldMk cId="1372095160" sldId="258"/>
+            <ac:picMk id="25" creationId="{24F7C093-A6BB-648D-1DB4-AE092BCCE45E}"/>
+          </ac:picMkLst>
+        </pc:picChg>
+        <pc:cxnChg chg="add mod">
+          <ac:chgData name="ME4-T DANZA SEAH" userId="29685724598694ca" providerId="LiveId" clId="{EA0173B0-958D-499E-BBD7-4DCDDBA7CDEB}" dt="2025-05-15T05:40:52.381" v="226" actId="14100"/>
+          <ac:cxnSpMkLst>
+            <pc:docMk/>
+            <pc:sldMk cId="1372095160" sldId="258"/>
+            <ac:cxnSpMk id="7" creationId="{ADB67048-26FC-4EA2-D35B-C067F249F01F}"/>
+          </ac:cxnSpMkLst>
+        </pc:cxnChg>
+        <pc:cxnChg chg="add mod">
+          <ac:chgData name="ME4-T DANZA SEAH" userId="29685724598694ca" providerId="LiveId" clId="{EA0173B0-958D-499E-BBD7-4DCDDBA7CDEB}" dt="2025-05-15T05:40:55.682" v="228" actId="14100"/>
+          <ac:cxnSpMkLst>
+            <pc:docMk/>
+            <pc:sldMk cId="1372095160" sldId="258"/>
+            <ac:cxnSpMk id="8" creationId="{1F3FDC7B-69D3-4AFF-C056-345C36687CE8}"/>
+          </ac:cxnSpMkLst>
+        </pc:cxnChg>
+        <pc:cxnChg chg="add mod">
+          <ac:chgData name="ME4-T DANZA SEAH" userId="29685724598694ca" providerId="LiveId" clId="{EA0173B0-958D-499E-BBD7-4DCDDBA7CDEB}" dt="2025-05-15T05:40:59.483" v="230" actId="14100"/>
+          <ac:cxnSpMkLst>
+            <pc:docMk/>
+            <pc:sldMk cId="1372095160" sldId="258"/>
+            <ac:cxnSpMk id="10" creationId="{938C00E5-9291-7DD6-9A67-748D8B77A96F}"/>
+          </ac:cxnSpMkLst>
+        </pc:cxnChg>
+        <pc:cxnChg chg="add mod">
+          <ac:chgData name="ME4-T DANZA SEAH" userId="29685724598694ca" providerId="LiveId" clId="{EA0173B0-958D-499E-BBD7-4DCDDBA7CDEB}" dt="2025-05-15T05:44:07.631" v="264" actId="208"/>
+          <ac:cxnSpMkLst>
+            <pc:docMk/>
+            <pc:sldMk cId="1372095160" sldId="258"/>
+            <ac:cxnSpMk id="12" creationId="{1F8A578C-717B-0C38-A811-5387EA42DD36}"/>
+          </ac:cxnSpMkLst>
+        </pc:cxnChg>
+        <pc:cxnChg chg="add mod">
+          <ac:chgData name="ME4-T DANZA SEAH" userId="29685724598694ca" providerId="LiveId" clId="{EA0173B0-958D-499E-BBD7-4DCDDBA7CDEB}" dt="2025-05-15T05:44:09.469" v="265" actId="208"/>
+          <ac:cxnSpMkLst>
+            <pc:docMk/>
+            <pc:sldMk cId="1372095160" sldId="258"/>
+            <ac:cxnSpMk id="14" creationId="{5E6DDE72-AF65-E226-B29B-BC0248C90E07}"/>
+          </ac:cxnSpMkLst>
+        </pc:cxnChg>
+        <pc:cxnChg chg="add mod">
+          <ac:chgData name="ME4-T DANZA SEAH" userId="29685724598694ca" providerId="LiveId" clId="{EA0173B0-958D-499E-BBD7-4DCDDBA7CDEB}" dt="2025-05-15T05:44:11.421" v="266" actId="208"/>
+          <ac:cxnSpMkLst>
+            <pc:docMk/>
+            <pc:sldMk cId="1372095160" sldId="258"/>
+            <ac:cxnSpMk id="16" creationId="{12F41673-2B7A-DF4C-6931-5A89305B2F55}"/>
+          </ac:cxnSpMkLst>
+        </pc:cxnChg>
+        <pc:cxnChg chg="add mod">
+          <ac:chgData name="ME4-T DANZA SEAH" userId="29685724598694ca" providerId="LiveId" clId="{EA0173B0-958D-499E-BBD7-4DCDDBA7CDEB}" dt="2025-05-15T05:41:28.522" v="240" actId="14100"/>
+          <ac:cxnSpMkLst>
+            <pc:docMk/>
+            <pc:sldMk cId="1372095160" sldId="258"/>
+            <ac:cxnSpMk id="18" creationId="{A2A2CFCF-B9EE-6049-D4EF-34571ADD7EDA}"/>
+          </ac:cxnSpMkLst>
+        </pc:cxnChg>
+        <pc:cxnChg chg="add mod">
+          <ac:chgData name="ME4-T DANZA SEAH" userId="29685724598694ca" providerId="LiveId" clId="{EA0173B0-958D-499E-BBD7-4DCDDBA7CDEB}" dt="2025-05-15T05:41:22.060" v="238" actId="14100"/>
+          <ac:cxnSpMkLst>
+            <pc:docMk/>
+            <pc:sldMk cId="1372095160" sldId="258"/>
+            <ac:cxnSpMk id="20" creationId="{9428C498-8B69-550F-D75C-AC780B297189}"/>
+          </ac:cxnSpMkLst>
+        </pc:cxnChg>
+        <pc:cxnChg chg="add mod">
+          <ac:chgData name="ME4-T DANZA SEAH" userId="29685724598694ca" providerId="LiveId" clId="{EA0173B0-958D-499E-BBD7-4DCDDBA7CDEB}" dt="2025-05-15T05:43:12.212" v="248" actId="1076"/>
+          <ac:cxnSpMkLst>
+            <pc:docMk/>
+            <pc:sldMk cId="1372095160" sldId="258"/>
+            <ac:cxnSpMk id="36" creationId="{76162C7F-7654-02E6-762A-D74214E743CF}"/>
+          </ac:cxnSpMkLst>
+        </pc:cxnChg>
+        <pc:cxnChg chg="add mod">
+          <ac:chgData name="ME4-T DANZA SEAH" userId="29685724598694ca" providerId="LiveId" clId="{EA0173B0-958D-499E-BBD7-4DCDDBA7CDEB}" dt="2025-05-15T05:44:13.680" v="267" actId="208"/>
+          <ac:cxnSpMkLst>
+            <pc:docMk/>
+            <pc:sldMk cId="1372095160" sldId="258"/>
+            <ac:cxnSpMk id="38" creationId="{D3BF04DA-FA58-122A-1E7E-09A2C1AF04D6}"/>
+          </ac:cxnSpMkLst>
+        </pc:cxnChg>
+        <pc:cxnChg chg="add mod">
+          <ac:chgData name="ME4-T DANZA SEAH" userId="29685724598694ca" providerId="LiveId" clId="{EA0173B0-958D-499E-BBD7-4DCDDBA7CDEB}" dt="2025-05-15T05:44:15.658" v="268" actId="208"/>
+          <ac:cxnSpMkLst>
+            <pc:docMk/>
+            <pc:sldMk cId="1372095160" sldId="258"/>
+            <ac:cxnSpMk id="40" creationId="{559CDD14-B269-EE72-5602-A33962C3C810}"/>
+          </ac:cxnSpMkLst>
+        </pc:cxnChg>
+        <pc:cxnChg chg="add mod">
+          <ac:chgData name="ME4-T DANZA SEAH" userId="29685724598694ca" providerId="LiveId" clId="{EA0173B0-958D-499E-BBD7-4DCDDBA7CDEB}" dt="2025-05-15T05:44:18.634" v="269" actId="208"/>
+          <ac:cxnSpMkLst>
+            <pc:docMk/>
+            <pc:sldMk cId="1372095160" sldId="258"/>
+            <ac:cxnSpMk id="42" creationId="{B7D0F3E1-DBE6-2EF6-E305-D01709A36210}"/>
+          </ac:cxnSpMkLst>
+        </pc:cxnChg>
+        <pc:cxnChg chg="add mod">
+          <ac:chgData name="ME4-T DANZA SEAH" userId="29685724598694ca" providerId="LiveId" clId="{EA0173B0-958D-499E-BBD7-4DCDDBA7CDEB}" dt="2025-05-15T05:43:41.637" v="260" actId="14100"/>
+          <ac:cxnSpMkLst>
+            <pc:docMk/>
+            <pc:sldMk cId="1372095160" sldId="258"/>
+            <ac:cxnSpMk id="44" creationId="{A60C296E-8130-85B4-9374-604A9274F2E6}"/>
+          </ac:cxnSpMkLst>
+        </pc:cxnChg>
+        <pc:cxnChg chg="add mod">
+          <ac:chgData name="ME4-T DANZA SEAH" userId="29685724598694ca" providerId="LiveId" clId="{EA0173B0-958D-499E-BBD7-4DCDDBA7CDEB}" dt="2025-05-15T05:43:47.433" v="263" actId="14100"/>
+          <ac:cxnSpMkLst>
+            <pc:docMk/>
+            <pc:sldMk cId="1372095160" sldId="258"/>
+            <ac:cxnSpMk id="46" creationId="{A908C54B-6750-659C-195C-FB8A6AC57A9B}"/>
+          </ac:cxnSpMkLst>
+        </pc:cxnChg>
+      </pc:sldChg>
     </pc:docChg>
   </pc:docChgLst>
 </pc:chgInfo>
@@ -350,7 +515,7 @@
           <a:p>
             <a:fld id="{11AD419D-279E-48D1-A551-2B3BEB64F0E3}" type="datetimeFigureOut">
               <a:rPr lang="en-SG" smtClean="0"/>
-              <a:t>13/5/2025</a:t>
+              <a:t>15/5/2025</a:t>
             </a:fld>
             <a:endParaRPr lang="en-SG"/>
           </a:p>
@@ -550,7 +715,7 @@
           <a:p>
             <a:fld id="{11AD419D-279E-48D1-A551-2B3BEB64F0E3}" type="datetimeFigureOut">
               <a:rPr lang="en-SG" smtClean="0"/>
-              <a:t>13/5/2025</a:t>
+              <a:t>15/5/2025</a:t>
             </a:fld>
             <a:endParaRPr lang="en-SG"/>
           </a:p>
@@ -760,7 +925,7 @@
           <a:p>
             <a:fld id="{11AD419D-279E-48D1-A551-2B3BEB64F0E3}" type="datetimeFigureOut">
               <a:rPr lang="en-SG" smtClean="0"/>
-              <a:t>13/5/2025</a:t>
+              <a:t>15/5/2025</a:t>
             </a:fld>
             <a:endParaRPr lang="en-SG"/>
           </a:p>
@@ -960,7 +1125,7 @@
           <a:p>
             <a:fld id="{11AD419D-279E-48D1-A551-2B3BEB64F0E3}" type="datetimeFigureOut">
               <a:rPr lang="en-SG" smtClean="0"/>
-              <a:t>13/5/2025</a:t>
+              <a:t>15/5/2025</a:t>
             </a:fld>
             <a:endParaRPr lang="en-SG"/>
           </a:p>
@@ -1236,7 +1401,7 @@
           <a:p>
             <a:fld id="{11AD419D-279E-48D1-A551-2B3BEB64F0E3}" type="datetimeFigureOut">
               <a:rPr lang="en-SG" smtClean="0"/>
-              <a:t>13/5/2025</a:t>
+              <a:t>15/5/2025</a:t>
             </a:fld>
             <a:endParaRPr lang="en-SG"/>
           </a:p>
@@ -1504,7 +1669,7 @@
           <a:p>
             <a:fld id="{11AD419D-279E-48D1-A551-2B3BEB64F0E3}" type="datetimeFigureOut">
               <a:rPr lang="en-SG" smtClean="0"/>
-              <a:t>13/5/2025</a:t>
+              <a:t>15/5/2025</a:t>
             </a:fld>
             <a:endParaRPr lang="en-SG"/>
           </a:p>
@@ -1919,7 +2084,7 @@
           <a:p>
             <a:fld id="{11AD419D-279E-48D1-A551-2B3BEB64F0E3}" type="datetimeFigureOut">
               <a:rPr lang="en-SG" smtClean="0"/>
-              <a:t>13/5/2025</a:t>
+              <a:t>15/5/2025</a:t>
             </a:fld>
             <a:endParaRPr lang="en-SG"/>
           </a:p>
@@ -2061,7 +2226,7 @@
           <a:p>
             <a:fld id="{11AD419D-279E-48D1-A551-2B3BEB64F0E3}" type="datetimeFigureOut">
               <a:rPr lang="en-SG" smtClean="0"/>
-              <a:t>13/5/2025</a:t>
+              <a:t>15/5/2025</a:t>
             </a:fld>
             <a:endParaRPr lang="en-SG"/>
           </a:p>
@@ -2174,7 +2339,7 @@
           <a:p>
             <a:fld id="{11AD419D-279E-48D1-A551-2B3BEB64F0E3}" type="datetimeFigureOut">
               <a:rPr lang="en-SG" smtClean="0"/>
-              <a:t>13/5/2025</a:t>
+              <a:t>15/5/2025</a:t>
             </a:fld>
             <a:endParaRPr lang="en-SG"/>
           </a:p>
@@ -2487,7 +2652,7 @@
           <a:p>
             <a:fld id="{11AD419D-279E-48D1-A551-2B3BEB64F0E3}" type="datetimeFigureOut">
               <a:rPr lang="en-SG" smtClean="0"/>
-              <a:t>13/5/2025</a:t>
+              <a:t>15/5/2025</a:t>
             </a:fld>
             <a:endParaRPr lang="en-SG"/>
           </a:p>
@@ -2776,7 +2941,7 @@
           <a:p>
             <a:fld id="{11AD419D-279E-48D1-A551-2B3BEB64F0E3}" type="datetimeFigureOut">
               <a:rPr lang="en-SG" smtClean="0"/>
-              <a:t>13/5/2025</a:t>
+              <a:t>15/5/2025</a:t>
             </a:fld>
             <a:endParaRPr lang="en-SG"/>
           </a:p>
@@ -3019,7 +3184,7 @@
           <a:p>
             <a:fld id="{11AD419D-279E-48D1-A551-2B3BEB64F0E3}" type="datetimeFigureOut">
               <a:rPr lang="en-SG" smtClean="0"/>
-              <a:t>13/5/2025</a:t>
+              <a:t>15/5/2025</a:t>
             </a:fld>
             <a:endParaRPr lang="en-SG"/>
           </a:p>
@@ -5003,6 +5168,658 @@
     <p:extLst>
       <p:ext uri="{BB962C8B-B14F-4D97-AF65-F5344CB8AC3E}">
         <p14:creationId xmlns:p14="http://schemas.microsoft.com/office/powerpoint/2010/main" val="968030662"/>
+      </p:ext>
+    </p:extLst>
+  </p:cSld>
+  <p:clrMapOvr>
+    <a:masterClrMapping/>
+  </p:clrMapOvr>
+</p:sld>
+</file>
+
+<file path=ppt/slides/slide3.xml><?xml version="1.0" encoding="utf-8"?>
+<p:sld xmlns:a="http://schemas.openxmlformats.org/drawingml/2006/main" xmlns:r="http://schemas.openxmlformats.org/officeDocument/2006/relationships" xmlns:p="http://schemas.openxmlformats.org/presentationml/2006/main">
+  <p:cSld>
+    <p:spTree>
+      <p:nvGrpSpPr>
+        <p:cNvPr id="1" name=""/>
+        <p:cNvGrpSpPr/>
+        <p:nvPr/>
+      </p:nvGrpSpPr>
+      <p:grpSpPr>
+        <a:xfrm>
+          <a:off x="0" y="0"/>
+          <a:ext cx="0" cy="0"/>
+          <a:chOff x="0" y="0"/>
+          <a:chExt cx="0" cy="0"/>
+        </a:xfrm>
+      </p:grpSpPr>
+      <p:pic>
+        <p:nvPicPr>
+          <p:cNvPr id="25" name="Picture 24">
+            <a:extLst>
+              <a:ext uri="{FF2B5EF4-FFF2-40B4-BE49-F238E27FC236}">
+                <a16:creationId xmlns:a16="http://schemas.microsoft.com/office/drawing/2014/main" id="{24F7C093-A6BB-648D-1DB4-AE092BCCE45E}"/>
+              </a:ext>
+            </a:extLst>
+          </p:cNvPr>
+          <p:cNvPicPr>
+            <a:picLocks noChangeAspect="1"/>
+          </p:cNvPicPr>
+          <p:nvPr/>
+        </p:nvPicPr>
+        <p:blipFill>
+          <a:blip r:embed="rId2"/>
+          <a:stretch>
+            <a:fillRect/>
+          </a:stretch>
+        </p:blipFill>
+        <p:spPr>
+          <a:xfrm>
+            <a:off x="82241" y="485623"/>
+            <a:ext cx="12027518" cy="5886753"/>
+          </a:xfrm>
+          <a:prstGeom prst="rect">
+            <a:avLst/>
+          </a:prstGeom>
+        </p:spPr>
+      </p:pic>
+      <p:cxnSp>
+        <p:nvCxnSpPr>
+          <p:cNvPr id="7" name="Straight Arrow Connector 6">
+            <a:extLst>
+              <a:ext uri="{FF2B5EF4-FFF2-40B4-BE49-F238E27FC236}">
+                <a16:creationId xmlns:a16="http://schemas.microsoft.com/office/drawing/2014/main" id="{ADB67048-26FC-4EA2-D35B-C067F249F01F}"/>
+              </a:ext>
+            </a:extLst>
+          </p:cNvPr>
+          <p:cNvCxnSpPr>
+            <a:cxnSpLocks/>
+          </p:cNvCxnSpPr>
+          <p:nvPr/>
+        </p:nvCxnSpPr>
+        <p:spPr>
+          <a:xfrm>
+            <a:off x="4129288" y="614805"/>
+            <a:ext cx="3044763" cy="69446"/>
+          </a:xfrm>
+          <a:prstGeom prst="straightConnector1">
+            <a:avLst/>
+          </a:prstGeom>
+          <a:ln>
+            <a:tailEnd type="triangle"/>
+          </a:ln>
+        </p:spPr>
+        <p:style>
+          <a:lnRef idx="2">
+            <a:schemeClr val="accent1"/>
+          </a:lnRef>
+          <a:fillRef idx="0">
+            <a:schemeClr val="accent1"/>
+          </a:fillRef>
+          <a:effectRef idx="1">
+            <a:schemeClr val="accent1"/>
+          </a:effectRef>
+          <a:fontRef idx="minor">
+            <a:schemeClr val="tx1"/>
+          </a:fontRef>
+        </p:style>
+      </p:cxnSp>
+      <p:cxnSp>
+        <p:nvCxnSpPr>
+          <p:cNvPr id="8" name="Straight Arrow Connector 7">
+            <a:extLst>
+              <a:ext uri="{FF2B5EF4-FFF2-40B4-BE49-F238E27FC236}">
+                <a16:creationId xmlns:a16="http://schemas.microsoft.com/office/drawing/2014/main" id="{1F3FDC7B-69D3-4AFF-C056-345C36687CE8}"/>
+              </a:ext>
+            </a:extLst>
+          </p:cNvPr>
+          <p:cNvCxnSpPr>
+            <a:cxnSpLocks/>
+          </p:cNvCxnSpPr>
+          <p:nvPr/>
+        </p:nvCxnSpPr>
+        <p:spPr>
+          <a:xfrm>
+            <a:off x="4129288" y="816378"/>
+            <a:ext cx="3124543" cy="224012"/>
+          </a:xfrm>
+          <a:prstGeom prst="straightConnector1">
+            <a:avLst/>
+          </a:prstGeom>
+          <a:ln>
+            <a:tailEnd type="triangle"/>
+          </a:ln>
+        </p:spPr>
+        <p:style>
+          <a:lnRef idx="2">
+            <a:schemeClr val="accent1"/>
+          </a:lnRef>
+          <a:fillRef idx="0">
+            <a:schemeClr val="accent1"/>
+          </a:fillRef>
+          <a:effectRef idx="1">
+            <a:schemeClr val="accent1"/>
+          </a:effectRef>
+          <a:fontRef idx="minor">
+            <a:schemeClr val="tx1"/>
+          </a:fontRef>
+        </p:style>
+      </p:cxnSp>
+      <p:cxnSp>
+        <p:nvCxnSpPr>
+          <p:cNvPr id="10" name="Straight Arrow Connector 9">
+            <a:extLst>
+              <a:ext uri="{FF2B5EF4-FFF2-40B4-BE49-F238E27FC236}">
+                <a16:creationId xmlns:a16="http://schemas.microsoft.com/office/drawing/2014/main" id="{938C00E5-9291-7DD6-9A67-748D8B77A96F}"/>
+              </a:ext>
+            </a:extLst>
+          </p:cNvPr>
+          <p:cNvCxnSpPr>
+            <a:cxnSpLocks/>
+          </p:cNvCxnSpPr>
+          <p:nvPr/>
+        </p:nvCxnSpPr>
+        <p:spPr>
+          <a:xfrm>
+            <a:off x="4129288" y="1013978"/>
+            <a:ext cx="3044763" cy="390202"/>
+          </a:xfrm>
+          <a:prstGeom prst="straightConnector1">
+            <a:avLst/>
+          </a:prstGeom>
+          <a:ln>
+            <a:tailEnd type="triangle"/>
+          </a:ln>
+        </p:spPr>
+        <p:style>
+          <a:lnRef idx="2">
+            <a:schemeClr val="accent1"/>
+          </a:lnRef>
+          <a:fillRef idx="0">
+            <a:schemeClr val="accent1"/>
+          </a:fillRef>
+          <a:effectRef idx="1">
+            <a:schemeClr val="accent1"/>
+          </a:effectRef>
+          <a:fontRef idx="minor">
+            <a:schemeClr val="tx1"/>
+          </a:fontRef>
+        </p:style>
+      </p:cxnSp>
+      <p:cxnSp>
+        <p:nvCxnSpPr>
+          <p:cNvPr id="12" name="Straight Arrow Connector 11">
+            <a:extLst>
+              <a:ext uri="{FF2B5EF4-FFF2-40B4-BE49-F238E27FC236}">
+                <a16:creationId xmlns:a16="http://schemas.microsoft.com/office/drawing/2014/main" id="{1F8A578C-717B-0C38-A811-5387EA42DD36}"/>
+              </a:ext>
+            </a:extLst>
+          </p:cNvPr>
+          <p:cNvCxnSpPr>
+            <a:cxnSpLocks/>
+          </p:cNvCxnSpPr>
+          <p:nvPr/>
+        </p:nvCxnSpPr>
+        <p:spPr>
+          <a:xfrm>
+            <a:off x="4183497" y="1946146"/>
+            <a:ext cx="3070334" cy="131434"/>
+          </a:xfrm>
+          <a:prstGeom prst="straightConnector1">
+            <a:avLst/>
+          </a:prstGeom>
+          <a:ln>
+            <a:solidFill>
+              <a:srgbClr val="FF0000"/>
+            </a:solidFill>
+            <a:tailEnd type="triangle"/>
+          </a:ln>
+        </p:spPr>
+        <p:style>
+          <a:lnRef idx="2">
+            <a:schemeClr val="accent1"/>
+          </a:lnRef>
+          <a:fillRef idx="0">
+            <a:schemeClr val="accent1"/>
+          </a:fillRef>
+          <a:effectRef idx="1">
+            <a:schemeClr val="accent1"/>
+          </a:effectRef>
+          <a:fontRef idx="minor">
+            <a:schemeClr val="tx1"/>
+          </a:fontRef>
+        </p:style>
+      </p:cxnSp>
+      <p:cxnSp>
+        <p:nvCxnSpPr>
+          <p:cNvPr id="14" name="Straight Arrow Connector 13">
+            <a:extLst>
+              <a:ext uri="{FF2B5EF4-FFF2-40B4-BE49-F238E27FC236}">
+                <a16:creationId xmlns:a16="http://schemas.microsoft.com/office/drawing/2014/main" id="{5E6DDE72-AF65-E226-B29B-BC0248C90E07}"/>
+              </a:ext>
+            </a:extLst>
+          </p:cNvPr>
+          <p:cNvCxnSpPr>
+            <a:cxnSpLocks/>
+          </p:cNvCxnSpPr>
+          <p:nvPr/>
+        </p:nvCxnSpPr>
+        <p:spPr>
+          <a:xfrm>
+            <a:off x="4183497" y="2199341"/>
+            <a:ext cx="3070334" cy="250190"/>
+          </a:xfrm>
+          <a:prstGeom prst="straightConnector1">
+            <a:avLst/>
+          </a:prstGeom>
+          <a:ln>
+            <a:solidFill>
+              <a:srgbClr val="FF0000"/>
+            </a:solidFill>
+            <a:tailEnd type="triangle"/>
+          </a:ln>
+        </p:spPr>
+        <p:style>
+          <a:lnRef idx="2">
+            <a:schemeClr val="accent1"/>
+          </a:lnRef>
+          <a:fillRef idx="0">
+            <a:schemeClr val="accent1"/>
+          </a:fillRef>
+          <a:effectRef idx="1">
+            <a:schemeClr val="accent1"/>
+          </a:effectRef>
+          <a:fontRef idx="minor">
+            <a:schemeClr val="tx1"/>
+          </a:fontRef>
+        </p:style>
+      </p:cxnSp>
+      <p:cxnSp>
+        <p:nvCxnSpPr>
+          <p:cNvPr id="16" name="Straight Arrow Connector 15">
+            <a:extLst>
+              <a:ext uri="{FF2B5EF4-FFF2-40B4-BE49-F238E27FC236}">
+                <a16:creationId xmlns:a16="http://schemas.microsoft.com/office/drawing/2014/main" id="{12F41673-2B7A-DF4C-6931-5A89305B2F55}"/>
+              </a:ext>
+            </a:extLst>
+          </p:cNvPr>
+          <p:cNvCxnSpPr>
+            <a:cxnSpLocks/>
+          </p:cNvCxnSpPr>
+          <p:nvPr/>
+        </p:nvCxnSpPr>
+        <p:spPr>
+          <a:xfrm>
+            <a:off x="4183497" y="2414219"/>
+            <a:ext cx="3070334" cy="290447"/>
+          </a:xfrm>
+          <a:prstGeom prst="straightConnector1">
+            <a:avLst/>
+          </a:prstGeom>
+          <a:ln>
+            <a:solidFill>
+              <a:srgbClr val="FF0000"/>
+            </a:solidFill>
+            <a:tailEnd type="triangle"/>
+          </a:ln>
+        </p:spPr>
+        <p:style>
+          <a:lnRef idx="2">
+            <a:schemeClr val="accent1"/>
+          </a:lnRef>
+          <a:fillRef idx="0">
+            <a:schemeClr val="accent1"/>
+          </a:fillRef>
+          <a:effectRef idx="1">
+            <a:schemeClr val="accent1"/>
+          </a:effectRef>
+          <a:fontRef idx="minor">
+            <a:schemeClr val="tx1"/>
+          </a:fontRef>
+        </p:style>
+      </p:cxnSp>
+      <p:cxnSp>
+        <p:nvCxnSpPr>
+          <p:cNvPr id="18" name="Straight Arrow Connector 17">
+            <a:extLst>
+              <a:ext uri="{FF2B5EF4-FFF2-40B4-BE49-F238E27FC236}">
+                <a16:creationId xmlns:a16="http://schemas.microsoft.com/office/drawing/2014/main" id="{A2A2CFCF-B9EE-6049-D4EF-34571ADD7EDA}"/>
+              </a:ext>
+            </a:extLst>
+          </p:cNvPr>
+          <p:cNvCxnSpPr>
+            <a:cxnSpLocks/>
+          </p:cNvCxnSpPr>
+          <p:nvPr/>
+        </p:nvCxnSpPr>
+        <p:spPr>
+          <a:xfrm flipV="1">
+            <a:off x="4129288" y="3068456"/>
+            <a:ext cx="3044763" cy="306846"/>
+          </a:xfrm>
+          <a:prstGeom prst="straightConnector1">
+            <a:avLst/>
+          </a:prstGeom>
+          <a:ln>
+            <a:tailEnd type="triangle"/>
+          </a:ln>
+        </p:spPr>
+        <p:style>
+          <a:lnRef idx="2">
+            <a:schemeClr val="accent1"/>
+          </a:lnRef>
+          <a:fillRef idx="0">
+            <a:schemeClr val="accent1"/>
+          </a:fillRef>
+          <a:effectRef idx="1">
+            <a:schemeClr val="accent1"/>
+          </a:effectRef>
+          <a:fontRef idx="minor">
+            <a:schemeClr val="tx1"/>
+          </a:fontRef>
+        </p:style>
+      </p:cxnSp>
+      <p:cxnSp>
+        <p:nvCxnSpPr>
+          <p:cNvPr id="20" name="Straight Arrow Connector 19">
+            <a:extLst>
+              <a:ext uri="{FF2B5EF4-FFF2-40B4-BE49-F238E27FC236}">
+                <a16:creationId xmlns:a16="http://schemas.microsoft.com/office/drawing/2014/main" id="{9428C498-8B69-550F-D75C-AC780B297189}"/>
+              </a:ext>
+            </a:extLst>
+          </p:cNvPr>
+          <p:cNvCxnSpPr>
+            <a:cxnSpLocks/>
+          </p:cNvCxnSpPr>
+          <p:nvPr/>
+        </p:nvCxnSpPr>
+        <p:spPr>
+          <a:xfrm flipV="1">
+            <a:off x="4129288" y="3428999"/>
+            <a:ext cx="3124543" cy="157214"/>
+          </a:xfrm>
+          <a:prstGeom prst="straightConnector1">
+            <a:avLst/>
+          </a:prstGeom>
+          <a:ln>
+            <a:tailEnd type="triangle"/>
+          </a:ln>
+        </p:spPr>
+        <p:style>
+          <a:lnRef idx="2">
+            <a:schemeClr val="accent1"/>
+          </a:lnRef>
+          <a:fillRef idx="0">
+            <a:schemeClr val="accent1"/>
+          </a:fillRef>
+          <a:effectRef idx="1">
+            <a:schemeClr val="accent1"/>
+          </a:effectRef>
+          <a:fontRef idx="minor">
+            <a:schemeClr val="tx1"/>
+          </a:fontRef>
+        </p:style>
+      </p:cxnSp>
+      <p:cxnSp>
+        <p:nvCxnSpPr>
+          <p:cNvPr id="36" name="Straight Arrow Connector 35">
+            <a:extLst>
+              <a:ext uri="{FF2B5EF4-FFF2-40B4-BE49-F238E27FC236}">
+                <a16:creationId xmlns:a16="http://schemas.microsoft.com/office/drawing/2014/main" id="{76162C7F-7654-02E6-762A-D74214E743CF}"/>
+              </a:ext>
+            </a:extLst>
+          </p:cNvPr>
+          <p:cNvCxnSpPr>
+            <a:cxnSpLocks/>
+          </p:cNvCxnSpPr>
+          <p:nvPr/>
+        </p:nvCxnSpPr>
+        <p:spPr>
+          <a:xfrm flipV="1">
+            <a:off x="4156392" y="3704860"/>
+            <a:ext cx="2990554" cy="68463"/>
+          </a:xfrm>
+          <a:prstGeom prst="straightConnector1">
+            <a:avLst/>
+          </a:prstGeom>
+          <a:ln>
+            <a:tailEnd type="triangle"/>
+          </a:ln>
+        </p:spPr>
+        <p:style>
+          <a:lnRef idx="2">
+            <a:schemeClr val="accent1"/>
+          </a:lnRef>
+          <a:fillRef idx="0">
+            <a:schemeClr val="accent1"/>
+          </a:fillRef>
+          <a:effectRef idx="1">
+            <a:schemeClr val="accent1"/>
+          </a:effectRef>
+          <a:fontRef idx="minor">
+            <a:schemeClr val="tx1"/>
+          </a:fontRef>
+        </p:style>
+      </p:cxnSp>
+      <p:cxnSp>
+        <p:nvCxnSpPr>
+          <p:cNvPr id="38" name="Straight Arrow Connector 37">
+            <a:extLst>
+              <a:ext uri="{FF2B5EF4-FFF2-40B4-BE49-F238E27FC236}">
+                <a16:creationId xmlns:a16="http://schemas.microsoft.com/office/drawing/2014/main" id="{D3BF04DA-FA58-122A-1E7E-09A2C1AF04D6}"/>
+              </a:ext>
+            </a:extLst>
+          </p:cNvPr>
+          <p:cNvCxnSpPr>
+            <a:cxnSpLocks/>
+          </p:cNvCxnSpPr>
+          <p:nvPr/>
+        </p:nvCxnSpPr>
+        <p:spPr>
+          <a:xfrm flipV="1">
+            <a:off x="4156392" y="4113807"/>
+            <a:ext cx="3017659" cy="595253"/>
+          </a:xfrm>
+          <a:prstGeom prst="straightConnector1">
+            <a:avLst/>
+          </a:prstGeom>
+          <a:ln>
+            <a:solidFill>
+              <a:srgbClr val="FF0000"/>
+            </a:solidFill>
+            <a:tailEnd type="triangle"/>
+          </a:ln>
+        </p:spPr>
+        <p:style>
+          <a:lnRef idx="2">
+            <a:schemeClr val="accent1"/>
+          </a:lnRef>
+          <a:fillRef idx="0">
+            <a:schemeClr val="accent1"/>
+          </a:fillRef>
+          <a:effectRef idx="1">
+            <a:schemeClr val="accent1"/>
+          </a:effectRef>
+          <a:fontRef idx="minor">
+            <a:schemeClr val="tx1"/>
+          </a:fontRef>
+        </p:style>
+      </p:cxnSp>
+      <p:cxnSp>
+        <p:nvCxnSpPr>
+          <p:cNvPr id="40" name="Straight Arrow Connector 39">
+            <a:extLst>
+              <a:ext uri="{FF2B5EF4-FFF2-40B4-BE49-F238E27FC236}">
+                <a16:creationId xmlns:a16="http://schemas.microsoft.com/office/drawing/2014/main" id="{559CDD14-B269-EE72-5602-A33962C3C810}"/>
+              </a:ext>
+            </a:extLst>
+          </p:cNvPr>
+          <p:cNvCxnSpPr>
+            <a:cxnSpLocks/>
+          </p:cNvCxnSpPr>
+          <p:nvPr/>
+        </p:nvCxnSpPr>
+        <p:spPr>
+          <a:xfrm flipV="1">
+            <a:off x="4169944" y="4411433"/>
+            <a:ext cx="3004107" cy="533630"/>
+          </a:xfrm>
+          <a:prstGeom prst="straightConnector1">
+            <a:avLst/>
+          </a:prstGeom>
+          <a:ln>
+            <a:solidFill>
+              <a:srgbClr val="FF0000"/>
+            </a:solidFill>
+            <a:tailEnd type="triangle"/>
+          </a:ln>
+        </p:spPr>
+        <p:style>
+          <a:lnRef idx="2">
+            <a:schemeClr val="accent1"/>
+          </a:lnRef>
+          <a:fillRef idx="0">
+            <a:schemeClr val="accent1"/>
+          </a:fillRef>
+          <a:effectRef idx="1">
+            <a:schemeClr val="accent1"/>
+          </a:effectRef>
+          <a:fontRef idx="minor">
+            <a:schemeClr val="tx1"/>
+          </a:fontRef>
+        </p:style>
+      </p:cxnSp>
+      <p:cxnSp>
+        <p:nvCxnSpPr>
+          <p:cNvPr id="42" name="Straight Arrow Connector 41">
+            <a:extLst>
+              <a:ext uri="{FF2B5EF4-FFF2-40B4-BE49-F238E27FC236}">
+                <a16:creationId xmlns:a16="http://schemas.microsoft.com/office/drawing/2014/main" id="{B7D0F3E1-DBE6-2EF6-E305-D01709A36210}"/>
+              </a:ext>
+            </a:extLst>
+          </p:cNvPr>
+          <p:cNvCxnSpPr>
+            <a:cxnSpLocks/>
+          </p:cNvCxnSpPr>
+          <p:nvPr/>
+        </p:nvCxnSpPr>
+        <p:spPr>
+          <a:xfrm flipV="1">
+            <a:off x="4156392" y="4762244"/>
+            <a:ext cx="3017659" cy="393657"/>
+          </a:xfrm>
+          <a:prstGeom prst="straightConnector1">
+            <a:avLst/>
+          </a:prstGeom>
+          <a:ln>
+            <a:solidFill>
+              <a:srgbClr val="FF0000"/>
+            </a:solidFill>
+            <a:tailEnd type="triangle"/>
+          </a:ln>
+        </p:spPr>
+        <p:style>
+          <a:lnRef idx="2">
+            <a:schemeClr val="accent1"/>
+          </a:lnRef>
+          <a:fillRef idx="0">
+            <a:schemeClr val="accent1"/>
+          </a:fillRef>
+          <a:effectRef idx="1">
+            <a:schemeClr val="accent1"/>
+          </a:effectRef>
+          <a:fontRef idx="minor">
+            <a:schemeClr val="tx1"/>
+          </a:fontRef>
+        </p:style>
+      </p:cxnSp>
+      <p:cxnSp>
+        <p:nvCxnSpPr>
+          <p:cNvPr id="44" name="Straight Arrow Connector 43">
+            <a:extLst>
+              <a:ext uri="{FF2B5EF4-FFF2-40B4-BE49-F238E27FC236}">
+                <a16:creationId xmlns:a16="http://schemas.microsoft.com/office/drawing/2014/main" id="{A60C296E-8130-85B4-9374-604A9274F2E6}"/>
+              </a:ext>
+            </a:extLst>
+          </p:cNvPr>
+          <p:cNvCxnSpPr>
+            <a:cxnSpLocks/>
+          </p:cNvCxnSpPr>
+          <p:nvPr/>
+        </p:nvCxnSpPr>
+        <p:spPr>
+          <a:xfrm flipV="1">
+            <a:off x="4075589" y="5049544"/>
+            <a:ext cx="3098462" cy="1044282"/>
+          </a:xfrm>
+          <a:prstGeom prst="straightConnector1">
+            <a:avLst/>
+          </a:prstGeom>
+          <a:ln>
+            <a:tailEnd type="triangle"/>
+          </a:ln>
+        </p:spPr>
+        <p:style>
+          <a:lnRef idx="2">
+            <a:schemeClr val="accent1"/>
+          </a:lnRef>
+          <a:fillRef idx="0">
+            <a:schemeClr val="accent1"/>
+          </a:fillRef>
+          <a:effectRef idx="1">
+            <a:schemeClr val="accent1"/>
+          </a:effectRef>
+          <a:fontRef idx="minor">
+            <a:schemeClr val="tx1"/>
+          </a:fontRef>
+        </p:style>
+      </p:cxnSp>
+      <p:cxnSp>
+        <p:nvCxnSpPr>
+          <p:cNvPr id="46" name="Straight Arrow Connector 45">
+            <a:extLst>
+              <a:ext uri="{FF2B5EF4-FFF2-40B4-BE49-F238E27FC236}">
+                <a16:creationId xmlns:a16="http://schemas.microsoft.com/office/drawing/2014/main" id="{A908C54B-6750-659C-195C-FB8A6AC57A9B}"/>
+              </a:ext>
+            </a:extLst>
+          </p:cNvPr>
+          <p:cNvCxnSpPr>
+            <a:cxnSpLocks/>
+          </p:cNvCxnSpPr>
+          <p:nvPr/>
+        </p:nvCxnSpPr>
+        <p:spPr>
+          <a:xfrm flipV="1">
+            <a:off x="4102438" y="5405683"/>
+            <a:ext cx="3071613" cy="924146"/>
+          </a:xfrm>
+          <a:prstGeom prst="straightConnector1">
+            <a:avLst/>
+          </a:prstGeom>
+          <a:ln>
+            <a:tailEnd type="triangle"/>
+          </a:ln>
+        </p:spPr>
+        <p:style>
+          <a:lnRef idx="2">
+            <a:schemeClr val="accent1"/>
+          </a:lnRef>
+          <a:fillRef idx="0">
+            <a:schemeClr val="accent1"/>
+          </a:fillRef>
+          <a:effectRef idx="1">
+            <a:schemeClr val="accent1"/>
+          </a:effectRef>
+          <a:fontRef idx="minor">
+            <a:schemeClr val="tx1"/>
+          </a:fontRef>
+        </p:style>
+      </p:cxnSp>
+    </p:spTree>
+    <p:extLst>
+      <p:ext uri="{BB962C8B-B14F-4D97-AF65-F5344CB8AC3E}">
+        <p14:creationId xmlns:p14="http://schemas.microsoft.com/office/powerpoint/2010/main" val="1372095160"/>
       </p:ext>
     </p:extLst>
   </p:cSld>

</xml_diff>